<commit_message>
[MEL-0007] - Time management presentation
</commit_message>
<xml_diff>
--- a/Presentations/Personality.pptx
+++ b/Presentations/Personality.pptx
@@ -214,7 +214,7 @@
           <a:p>
             <a:fld id="{BE922CAB-3410-47F5-A79E-CF5894AF3626}" type="datetimeFigureOut">
               <a:rPr lang="pt-PT" smtClean="0"/>
-              <a:t>26/08/2020</a:t>
+              <a:t>01/09/2020</a:t>
             </a:fld>
             <a:endParaRPr lang="pt-PT"/>
           </a:p>
@@ -631,7 +631,7 @@
           <a:p>
             <a:fld id="{A18E2B5E-2BAC-408C-9D01-DD90C7E8DCBE}" type="datetimeFigureOut">
               <a:rPr lang="pt-PT" smtClean="0"/>
-              <a:t>26/08/2020</a:t>
+              <a:t>01/09/2020</a:t>
             </a:fld>
             <a:endParaRPr lang="pt-PT"/>
           </a:p>
@@ -843,7 +843,7 @@
           <a:p>
             <a:fld id="{A18E2B5E-2BAC-408C-9D01-DD90C7E8DCBE}" type="datetimeFigureOut">
               <a:rPr lang="pt-PT" smtClean="0"/>
-              <a:t>26/08/2020</a:t>
+              <a:t>01/09/2020</a:t>
             </a:fld>
             <a:endParaRPr lang="pt-PT"/>
           </a:p>
@@ -1065,7 +1065,7 @@
           <a:p>
             <a:fld id="{A18E2B5E-2BAC-408C-9D01-DD90C7E8DCBE}" type="datetimeFigureOut">
               <a:rPr lang="pt-PT" smtClean="0"/>
-              <a:t>26/08/2020</a:t>
+              <a:t>01/09/2020</a:t>
             </a:fld>
             <a:endParaRPr lang="pt-PT"/>
           </a:p>
@@ -1277,7 +1277,7 @@
           <a:p>
             <a:fld id="{A18E2B5E-2BAC-408C-9D01-DD90C7E8DCBE}" type="datetimeFigureOut">
               <a:rPr lang="pt-PT" smtClean="0"/>
-              <a:t>26/08/2020</a:t>
+              <a:t>01/09/2020</a:t>
             </a:fld>
             <a:endParaRPr lang="pt-PT"/>
           </a:p>
@@ -1565,7 +1565,7 @@
           <a:p>
             <a:fld id="{A18E2B5E-2BAC-408C-9D01-DD90C7E8DCBE}" type="datetimeFigureOut">
               <a:rPr lang="pt-PT" smtClean="0"/>
-              <a:t>26/08/2020</a:t>
+              <a:t>01/09/2020</a:t>
             </a:fld>
             <a:endParaRPr lang="pt-PT"/>
           </a:p>
@@ -1845,7 +1845,7 @@
           <a:p>
             <a:fld id="{A18E2B5E-2BAC-408C-9D01-DD90C7E8DCBE}" type="datetimeFigureOut">
               <a:rPr lang="pt-PT" smtClean="0"/>
-              <a:t>26/08/2020</a:t>
+              <a:t>01/09/2020</a:t>
             </a:fld>
             <a:endParaRPr lang="pt-PT"/>
           </a:p>
@@ -2272,7 +2272,7 @@
           <a:p>
             <a:fld id="{A18E2B5E-2BAC-408C-9D01-DD90C7E8DCBE}" type="datetimeFigureOut">
               <a:rPr lang="pt-PT" smtClean="0"/>
-              <a:t>26/08/2020</a:t>
+              <a:t>01/09/2020</a:t>
             </a:fld>
             <a:endParaRPr lang="pt-PT"/>
           </a:p>
@@ -2426,7 +2426,7 @@
           <a:p>
             <a:fld id="{A18E2B5E-2BAC-408C-9D01-DD90C7E8DCBE}" type="datetimeFigureOut">
               <a:rPr lang="pt-PT" smtClean="0"/>
-              <a:t>26/08/2020</a:t>
+              <a:t>01/09/2020</a:t>
             </a:fld>
             <a:endParaRPr lang="pt-PT"/>
           </a:p>
@@ -2551,7 +2551,7 @@
           <a:p>
             <a:fld id="{A18E2B5E-2BAC-408C-9D01-DD90C7E8DCBE}" type="datetimeFigureOut">
               <a:rPr lang="pt-PT" smtClean="0"/>
-              <a:t>26/08/2020</a:t>
+              <a:t>01/09/2020</a:t>
             </a:fld>
             <a:endParaRPr lang="pt-PT"/>
           </a:p>
@@ -2876,7 +2876,7 @@
           <a:p>
             <a:fld id="{A18E2B5E-2BAC-408C-9D01-DD90C7E8DCBE}" type="datetimeFigureOut">
               <a:rPr lang="pt-PT" smtClean="0"/>
-              <a:t>26/08/2020</a:t>
+              <a:t>01/09/2020</a:t>
             </a:fld>
             <a:endParaRPr lang="pt-PT"/>
           </a:p>
@@ -3177,7 +3177,7 @@
           <a:p>
             <a:fld id="{A18E2B5E-2BAC-408C-9D01-DD90C7E8DCBE}" type="datetimeFigureOut">
               <a:rPr lang="pt-PT" smtClean="0"/>
-              <a:t>26/08/2020</a:t>
+              <a:t>01/09/2020</a:t>
             </a:fld>
             <a:endParaRPr lang="pt-PT"/>
           </a:p>
@@ -3432,7 +3432,7 @@
           <a:p>
             <a:fld id="{A18E2B5E-2BAC-408C-9D01-DD90C7E8DCBE}" type="datetimeFigureOut">
               <a:rPr lang="pt-PT" smtClean="0"/>
-              <a:t>26/08/2020</a:t>
+              <a:t>01/09/2020</a:t>
             </a:fld>
             <a:endParaRPr lang="pt-PT"/>
           </a:p>
@@ -4341,10 +4341,10 @@
       </p:grpSp>
       <p:grpSp>
         <p:nvGrpSpPr>
-          <p:cNvPr id="6" name="SacrificeObjetive">
+          <p:cNvPr id="4" name="Agrupar 3">
             <a:extLst>
               <a:ext uri="{FF2B5EF4-FFF2-40B4-BE49-F238E27FC236}">
-                <a16:creationId xmlns:a16="http://schemas.microsoft.com/office/drawing/2014/main" id="{93C10519-21D4-49E1-84E2-6CDBD62BDAB2}"/>
+                <a16:creationId xmlns:a16="http://schemas.microsoft.com/office/drawing/2014/main" id="{85DECA21-23C2-42F1-B954-1FC2A75D0790}"/>
               </a:ext>
             </a:extLst>
           </p:cNvPr>
@@ -4353,18 +4353,18 @@
         </p:nvGrpSpPr>
         <p:grpSpPr>
           <a:xfrm>
-            <a:off x="8362521" y="3381474"/>
-            <a:ext cx="3275164" cy="3133076"/>
-            <a:chOff x="8362521" y="3381474"/>
-            <a:chExt cx="3275164" cy="3133076"/>
+            <a:off x="9051552" y="4112969"/>
+            <a:ext cx="1891512" cy="1889944"/>
+            <a:chOff x="9604258" y="4011194"/>
+            <a:chExt cx="2121742" cy="2121742"/>
           </a:xfrm>
         </p:grpSpPr>
         <p:grpSp>
           <p:nvGrpSpPr>
-            <p:cNvPr id="4" name="Agrupar 3">
+            <p:cNvPr id="33" name="TargetOuter">
               <a:extLst>
                 <a:ext uri="{FF2B5EF4-FFF2-40B4-BE49-F238E27FC236}">
-                  <a16:creationId xmlns:a16="http://schemas.microsoft.com/office/drawing/2014/main" id="{85DECA21-23C2-42F1-B954-1FC2A75D0790}"/>
+                  <a16:creationId xmlns:a16="http://schemas.microsoft.com/office/drawing/2014/main" id="{4EE1D23D-7A06-4E70-BE73-325214E2DD89}"/>
                 </a:ext>
               </a:extLst>
             </p:cNvPr>
@@ -4373,216 +4373,18 @@
           </p:nvGrpSpPr>
           <p:grpSpPr>
             <a:xfrm>
-              <a:off x="9077271" y="3973827"/>
-              <a:ext cx="1891512" cy="1889944"/>
-              <a:chOff x="9604259" y="4011194"/>
-              <a:chExt cx="2121742" cy="2121742"/>
+              <a:off x="9604258" y="4011194"/>
+              <a:ext cx="2121742" cy="2121742"/>
+              <a:chOff x="4219798" y="1629000"/>
+              <a:chExt cx="3600000" cy="3600000"/>
             </a:xfrm>
           </p:grpSpPr>
-          <p:grpSp>
-            <p:nvGrpSpPr>
-              <p:cNvPr id="33" name="TargetOuter">
+          <p:sp>
+            <p:nvSpPr>
+              <p:cNvPr id="34" name="Oval 33">
                 <a:extLst>
                   <a:ext uri="{FF2B5EF4-FFF2-40B4-BE49-F238E27FC236}">
-                    <a16:creationId xmlns:a16="http://schemas.microsoft.com/office/drawing/2014/main" id="{4EE1D23D-7A06-4E70-BE73-325214E2DD89}"/>
-                  </a:ext>
-                </a:extLst>
-              </p:cNvPr>
-              <p:cNvGrpSpPr/>
-              <p:nvPr/>
-            </p:nvGrpSpPr>
-            <p:grpSpPr>
-              <a:xfrm>
-                <a:off x="9604259" y="4011194"/>
-                <a:ext cx="2121742" cy="2121742"/>
-                <a:chOff x="4219800" y="1629000"/>
-                <a:chExt cx="3600000" cy="3600000"/>
-              </a:xfrm>
-            </p:grpSpPr>
-            <p:sp>
-              <p:nvSpPr>
-                <p:cNvPr id="34" name="Oval 33">
-                  <a:extLst>
-                    <a:ext uri="{FF2B5EF4-FFF2-40B4-BE49-F238E27FC236}">
-                      <a16:creationId xmlns:a16="http://schemas.microsoft.com/office/drawing/2014/main" id="{8027C818-7371-404E-80B4-6293A5D18A1F}"/>
-                    </a:ext>
-                  </a:extLst>
-                </p:cNvPr>
-                <p:cNvSpPr/>
-                <p:nvPr/>
-              </p:nvSpPr>
-              <p:spPr>
-                <a:xfrm>
-                  <a:off x="4219800" y="1629000"/>
-                  <a:ext cx="3600000" cy="3600000"/>
-                </a:xfrm>
-                <a:prstGeom prst="ellipse">
-                  <a:avLst/>
-                </a:prstGeom>
-                <a:solidFill>
-                  <a:schemeClr val="bg1"/>
-                </a:solidFill>
-                <a:ln>
-                  <a:noFill/>
-                </a:ln>
-                <a:effectLst>
-                  <a:outerShdw blurRad="63500" sx="102000" sy="102000" algn="ctr" rotWithShape="0">
-                    <a:prstClr val="black">
-                      <a:alpha val="40000"/>
-                    </a:prstClr>
-                  </a:outerShdw>
-                </a:effectLst>
-              </p:spPr>
-              <p:style>
-                <a:lnRef idx="2">
-                  <a:schemeClr val="accent1">
-                    <a:shade val="50000"/>
-                  </a:schemeClr>
-                </a:lnRef>
-                <a:fillRef idx="1">
-                  <a:schemeClr val="accent1"/>
-                </a:fillRef>
-                <a:effectRef idx="0">
-                  <a:schemeClr val="accent1"/>
-                </a:effectRef>
-                <a:fontRef idx="minor">
-                  <a:schemeClr val="lt1"/>
-                </a:fontRef>
-              </p:style>
-              <p:txBody>
-                <a:bodyPr rtlCol="0" anchor="ctr"/>
-                <a:lstStyle/>
-                <a:p>
-                  <a:pPr algn="ctr"/>
-                  <a:endParaRPr lang="pt-PT" dirty="0"/>
-                </a:p>
-              </p:txBody>
-            </p:sp>
-            <p:sp>
-              <p:nvSpPr>
-                <p:cNvPr id="35" name="Oval 34">
-                  <a:extLst>
-                    <a:ext uri="{FF2B5EF4-FFF2-40B4-BE49-F238E27FC236}">
-                      <a16:creationId xmlns:a16="http://schemas.microsoft.com/office/drawing/2014/main" id="{96D0F6BC-9DE4-4F49-AE32-CEBF7CF3E514}"/>
-                    </a:ext>
-                  </a:extLst>
-                </p:cNvPr>
-                <p:cNvSpPr/>
-                <p:nvPr/>
-              </p:nvSpPr>
-              <p:spPr>
-                <a:xfrm>
-                  <a:off x="4579800" y="1989000"/>
-                  <a:ext cx="2880000" cy="2880000"/>
-                </a:xfrm>
-                <a:prstGeom prst="ellipse">
-                  <a:avLst/>
-                </a:prstGeom>
-                <a:solidFill>
-                  <a:srgbClr val="FF0000"/>
-                </a:solidFill>
-                <a:ln>
-                  <a:noFill/>
-                </a:ln>
-                <a:effectLst>
-                  <a:outerShdw blurRad="63500" sx="102000" sy="102000" algn="ctr" rotWithShape="0">
-                    <a:prstClr val="black">
-                      <a:alpha val="40000"/>
-                    </a:prstClr>
-                  </a:outerShdw>
-                </a:effectLst>
-              </p:spPr>
-              <p:style>
-                <a:lnRef idx="2">
-                  <a:schemeClr val="accent1">
-                    <a:shade val="50000"/>
-                  </a:schemeClr>
-                </a:lnRef>
-                <a:fillRef idx="1">
-                  <a:schemeClr val="accent1"/>
-                </a:fillRef>
-                <a:effectRef idx="0">
-                  <a:schemeClr val="accent1"/>
-                </a:effectRef>
-                <a:fontRef idx="minor">
-                  <a:schemeClr val="lt1"/>
-                </a:fontRef>
-              </p:style>
-              <p:txBody>
-                <a:bodyPr rtlCol="0" anchor="ctr"/>
-                <a:lstStyle/>
-                <a:p>
-                  <a:pPr algn="ctr"/>
-                  <a:endParaRPr lang="pt-PT"/>
-                </a:p>
-              </p:txBody>
-            </p:sp>
-            <p:sp>
-              <p:nvSpPr>
-                <p:cNvPr id="36" name="Oval 35">
-                  <a:extLst>
-                    <a:ext uri="{FF2B5EF4-FFF2-40B4-BE49-F238E27FC236}">
-                      <a16:creationId xmlns:a16="http://schemas.microsoft.com/office/drawing/2014/main" id="{9AD030C0-77A2-4532-BB7A-0D197E8E3080}"/>
-                    </a:ext>
-                  </a:extLst>
-                </p:cNvPr>
-                <p:cNvSpPr/>
-                <p:nvPr/>
-              </p:nvSpPr>
-              <p:spPr>
-                <a:xfrm>
-                  <a:off x="4939800" y="2349000"/>
-                  <a:ext cx="2160000" cy="2160000"/>
-                </a:xfrm>
-                <a:prstGeom prst="ellipse">
-                  <a:avLst/>
-                </a:prstGeom>
-                <a:solidFill>
-                  <a:schemeClr val="bg1"/>
-                </a:solidFill>
-                <a:ln>
-                  <a:noFill/>
-                </a:ln>
-                <a:effectLst>
-                  <a:outerShdw blurRad="63500" sx="102000" sy="102000" algn="ctr" rotWithShape="0">
-                    <a:prstClr val="black">
-                      <a:alpha val="40000"/>
-                    </a:prstClr>
-                  </a:outerShdw>
-                </a:effectLst>
-              </p:spPr>
-              <p:style>
-                <a:lnRef idx="2">
-                  <a:schemeClr val="accent1">
-                    <a:shade val="50000"/>
-                  </a:schemeClr>
-                </a:lnRef>
-                <a:fillRef idx="1">
-                  <a:schemeClr val="accent1"/>
-                </a:fillRef>
-                <a:effectRef idx="0">
-                  <a:schemeClr val="accent1"/>
-                </a:effectRef>
-                <a:fontRef idx="minor">
-                  <a:schemeClr val="lt1"/>
-                </a:fontRef>
-              </p:style>
-              <p:txBody>
-                <a:bodyPr rtlCol="0" anchor="ctr"/>
-                <a:lstStyle/>
-                <a:p>
-                  <a:pPr algn="ctr"/>
-                  <a:endParaRPr lang="pt-PT"/>
-                </a:p>
-              </p:txBody>
-            </p:sp>
-          </p:grpSp>
-          <p:sp>
-            <p:nvSpPr>
-              <p:cNvPr id="37" name="TargetInner">
-                <a:extLst>
-                  <a:ext uri="{FF2B5EF4-FFF2-40B4-BE49-F238E27FC236}">
-                    <a16:creationId xmlns:a16="http://schemas.microsoft.com/office/drawing/2014/main" id="{AA93F56C-EE9B-404E-9BA9-BC091F792962}"/>
+                    <a16:creationId xmlns:a16="http://schemas.microsoft.com/office/drawing/2014/main" id="{8027C818-7371-404E-80B4-6293A5D18A1F}"/>
                   </a:ext>
                 </a:extLst>
               </p:cNvPr>
@@ -4591,14 +4393,132 @@
             </p:nvSpPr>
             <p:spPr>
               <a:xfrm>
-                <a:off x="10235968" y="4655105"/>
-                <a:ext cx="848697" cy="848697"/>
+                <a:off x="4219798" y="1629000"/>
+                <a:ext cx="3600000" cy="3600000"/>
               </a:xfrm>
               <a:prstGeom prst="ellipse">
                 <a:avLst/>
               </a:prstGeom>
               <a:solidFill>
-                <a:srgbClr val="C00000"/>
+                <a:schemeClr val="bg1"/>
+              </a:solidFill>
+              <a:ln>
+                <a:noFill/>
+              </a:ln>
+              <a:effectLst>
+                <a:outerShdw blurRad="63500" sx="102000" sy="102000" algn="ctr" rotWithShape="0">
+                  <a:prstClr val="black">
+                    <a:alpha val="40000"/>
+                  </a:prstClr>
+                </a:outerShdw>
+              </a:effectLst>
+            </p:spPr>
+            <p:style>
+              <a:lnRef idx="2">
+                <a:schemeClr val="accent1">
+                  <a:shade val="50000"/>
+                </a:schemeClr>
+              </a:lnRef>
+              <a:fillRef idx="1">
+                <a:schemeClr val="accent1"/>
+              </a:fillRef>
+              <a:effectRef idx="0">
+                <a:schemeClr val="accent1"/>
+              </a:effectRef>
+              <a:fontRef idx="minor">
+                <a:schemeClr val="lt1"/>
+              </a:fontRef>
+            </p:style>
+            <p:txBody>
+              <a:bodyPr rtlCol="0" anchor="ctr"/>
+              <a:lstStyle/>
+              <a:p>
+                <a:pPr algn="ctr"/>
+                <a:endParaRPr lang="pt-PT" dirty="0"/>
+              </a:p>
+            </p:txBody>
+          </p:sp>
+          <p:sp>
+            <p:nvSpPr>
+              <p:cNvPr id="35" name="Oval 34">
+                <a:extLst>
+                  <a:ext uri="{FF2B5EF4-FFF2-40B4-BE49-F238E27FC236}">
+                    <a16:creationId xmlns:a16="http://schemas.microsoft.com/office/drawing/2014/main" id="{96D0F6BC-9DE4-4F49-AE32-CEBF7CF3E514}"/>
+                  </a:ext>
+                </a:extLst>
+              </p:cNvPr>
+              <p:cNvSpPr/>
+              <p:nvPr/>
+            </p:nvSpPr>
+            <p:spPr>
+              <a:xfrm>
+                <a:off x="4579800" y="1989000"/>
+                <a:ext cx="2880000" cy="2880000"/>
+              </a:xfrm>
+              <a:prstGeom prst="ellipse">
+                <a:avLst/>
+              </a:prstGeom>
+              <a:solidFill>
+                <a:srgbClr val="FF0000"/>
+              </a:solidFill>
+              <a:ln>
+                <a:noFill/>
+              </a:ln>
+              <a:effectLst>
+                <a:outerShdw blurRad="63500" sx="102000" sy="102000" algn="ctr" rotWithShape="0">
+                  <a:prstClr val="black">
+                    <a:alpha val="40000"/>
+                  </a:prstClr>
+                </a:outerShdw>
+              </a:effectLst>
+            </p:spPr>
+            <p:style>
+              <a:lnRef idx="2">
+                <a:schemeClr val="accent1">
+                  <a:shade val="50000"/>
+                </a:schemeClr>
+              </a:lnRef>
+              <a:fillRef idx="1">
+                <a:schemeClr val="accent1"/>
+              </a:fillRef>
+              <a:effectRef idx="0">
+                <a:schemeClr val="accent1"/>
+              </a:effectRef>
+              <a:fontRef idx="minor">
+                <a:schemeClr val="lt1"/>
+              </a:fontRef>
+            </p:style>
+            <p:txBody>
+              <a:bodyPr rtlCol="0" anchor="ctr"/>
+              <a:lstStyle/>
+              <a:p>
+                <a:pPr algn="ctr"/>
+                <a:endParaRPr lang="pt-PT"/>
+              </a:p>
+            </p:txBody>
+          </p:sp>
+          <p:sp>
+            <p:nvSpPr>
+              <p:cNvPr id="36" name="Oval 35">
+                <a:extLst>
+                  <a:ext uri="{FF2B5EF4-FFF2-40B4-BE49-F238E27FC236}">
+                    <a16:creationId xmlns:a16="http://schemas.microsoft.com/office/drawing/2014/main" id="{9AD030C0-77A2-4532-BB7A-0D197E8E3080}"/>
+                  </a:ext>
+                </a:extLst>
+              </p:cNvPr>
+              <p:cNvSpPr/>
+              <p:nvPr/>
+            </p:nvSpPr>
+            <p:spPr>
+              <a:xfrm>
+                <a:off x="4939800" y="2349000"/>
+                <a:ext cx="2160000" cy="2160000"/>
+              </a:xfrm>
+              <a:prstGeom prst="ellipse">
+                <a:avLst/>
+              </a:prstGeom>
+              <a:solidFill>
+                <a:schemeClr val="bg1"/>
               </a:solidFill>
               <a:ln>
                 <a:noFill/>
@@ -4639,10 +4559,10 @@
         </p:grpSp>
         <p:sp>
           <p:nvSpPr>
-            <p:cNvPr id="3" name="Block">
+            <p:cNvPr id="37" name="TargetInner">
               <a:extLst>
                 <a:ext uri="{FF2B5EF4-FFF2-40B4-BE49-F238E27FC236}">
-                  <a16:creationId xmlns:a16="http://schemas.microsoft.com/office/drawing/2014/main" id="{973023CA-E6DE-4170-B457-4285431B7AD6}"/>
+                  <a16:creationId xmlns:a16="http://schemas.microsoft.com/office/drawing/2014/main" id="{AA93F56C-EE9B-404E-9BA9-BC091F792962}"/>
                 </a:ext>
               </a:extLst>
             </p:cNvPr>
@@ -4651,10 +4571,10 @@
           </p:nvSpPr>
           <p:spPr>
             <a:xfrm>
-              <a:off x="8362521" y="3381474"/>
-              <a:ext cx="3275164" cy="3133076"/>
+              <a:off x="10235968" y="4655105"/>
+              <a:ext cx="848697" cy="848697"/>
             </a:xfrm>
-            <a:prstGeom prst="noSmoking">
+            <a:prstGeom prst="ellipse">
               <a:avLst/>
             </a:prstGeom>
             <a:solidFill>
@@ -4663,6 +4583,13 @@
             <a:ln>
               <a:noFill/>
             </a:ln>
+            <a:effectLst>
+              <a:outerShdw blurRad="63500" sx="102000" sy="102000" algn="ctr" rotWithShape="0">
+                <a:prstClr val="black">
+                  <a:alpha val="40000"/>
+                </a:prstClr>
+              </a:outerShdw>
+            </a:effectLst>
           </p:spPr>
           <p:style>
             <a:lnRef idx="2">
@@ -4685,15 +4612,67 @@
             <a:lstStyle/>
             <a:p>
               <a:pPr algn="ctr"/>
-              <a:endParaRPr lang="pt-PT" dirty="0">
-                <a:solidFill>
-                  <a:schemeClr val="tx1"/>
-                </a:solidFill>
-              </a:endParaRPr>
+              <a:endParaRPr lang="pt-PT"/>
             </a:p>
           </p:txBody>
         </p:sp>
       </p:grpSp>
+      <p:sp>
+        <p:nvSpPr>
+          <p:cNvPr id="3" name="Block" hidden="1">
+            <a:extLst>
+              <a:ext uri="{FF2B5EF4-FFF2-40B4-BE49-F238E27FC236}">
+                <a16:creationId xmlns:a16="http://schemas.microsoft.com/office/drawing/2014/main" id="{973023CA-E6DE-4170-B457-4285431B7AD6}"/>
+              </a:ext>
+            </a:extLst>
+          </p:cNvPr>
+          <p:cNvSpPr/>
+          <p:nvPr/>
+        </p:nvSpPr>
+        <p:spPr>
+          <a:xfrm>
+            <a:off x="8469446" y="3391569"/>
+            <a:ext cx="3275164" cy="3133076"/>
+          </a:xfrm>
+          <a:prstGeom prst="noSmoking">
+            <a:avLst/>
+          </a:prstGeom>
+          <a:solidFill>
+            <a:srgbClr val="C00000"/>
+          </a:solidFill>
+          <a:ln>
+            <a:noFill/>
+          </a:ln>
+        </p:spPr>
+        <p:style>
+          <a:lnRef idx="2">
+            <a:schemeClr val="accent1">
+              <a:shade val="50000"/>
+            </a:schemeClr>
+          </a:lnRef>
+          <a:fillRef idx="1">
+            <a:schemeClr val="accent1"/>
+          </a:fillRef>
+          <a:effectRef idx="0">
+            <a:schemeClr val="accent1"/>
+          </a:effectRef>
+          <a:fontRef idx="minor">
+            <a:schemeClr val="lt1"/>
+          </a:fontRef>
+        </p:style>
+        <p:txBody>
+          <a:bodyPr rtlCol="0" anchor="ctr"/>
+          <a:lstStyle/>
+          <a:p>
+            <a:pPr algn="ctr"/>
+            <a:endParaRPr lang="pt-PT" dirty="0">
+              <a:solidFill>
+                <a:schemeClr val="tx1"/>
+              </a:solidFill>
+            </a:endParaRPr>
+          </a:p>
+        </p:txBody>
+      </p:sp>
       <p:grpSp>
         <p:nvGrpSpPr>
           <p:cNvPr id="41" name="ComposedLen">
@@ -5272,59 +5251,6 @@
                                         <p:cTn id="26" dur="500"/>
                                         <p:tgtEl>
                                           <p:spTgt spid="5"/>
-                                        </p:tgtEl>
-                                      </p:cBhvr>
-                                    </p:animEffect>
-                                  </p:childTnLst>
-                                </p:cTn>
-                              </p:par>
-                            </p:childTnLst>
-                          </p:cTn>
-                        </p:par>
-                      </p:childTnLst>
-                    </p:cTn>
-                  </p:par>
-                  <p:par>
-                    <p:cTn id="27" fill="hold">
-                      <p:stCondLst>
-                        <p:cond delay="indefinite"/>
-                      </p:stCondLst>
-                      <p:childTnLst>
-                        <p:par>
-                          <p:cTn id="28" fill="hold">
-                            <p:stCondLst>
-                              <p:cond delay="0"/>
-                            </p:stCondLst>
-                            <p:childTnLst>
-                              <p:par>
-                                <p:cTn id="29" presetID="10" presetClass="entr" presetSubtype="0" fill="hold" nodeType="clickEffect">
-                                  <p:stCondLst>
-                                    <p:cond delay="0"/>
-                                  </p:stCondLst>
-                                  <p:childTnLst>
-                                    <p:set>
-                                      <p:cBhvr>
-                                        <p:cTn id="30" dur="1" fill="hold">
-                                          <p:stCondLst>
-                                            <p:cond delay="0"/>
-                                          </p:stCondLst>
-                                        </p:cTn>
-                                        <p:tgtEl>
-                                          <p:spTgt spid="6"/>
-                                        </p:tgtEl>
-                                        <p:attrNameLst>
-                                          <p:attrName>style.visibility</p:attrName>
-                                        </p:attrNameLst>
-                                      </p:cBhvr>
-                                      <p:to>
-                                        <p:strVal val="visible"/>
-                                      </p:to>
-                                    </p:set>
-                                    <p:animEffect transition="in" filter="fade">
-                                      <p:cBhvr>
-                                        <p:cTn id="31" dur="500"/>
-                                        <p:tgtEl>
-                                          <p:spTgt spid="6"/>
                                         </p:tgtEl>
                                       </p:cBhvr>
                                     </p:animEffect>

</xml_diff>